<commit_message>
Atualizado agora de verdade
</commit_message>
<xml_diff>
--- a/Slides/Sprint 1 ATUALIZADO 1.pptx
+++ b/Slides/Sprint 1 ATUALIZADO 1.pptx
@@ -19077,14 +19077,8 @@
             </a:pPr>
             <a:r>
               <a:rPr lang="pt-BR" b="1" u="sng" dirty="0"/>
-              <a:t>Nosso produto </a:t>
+              <a:t>Nosso </a:t>
             </a:r>
-          </a:p>
-          <a:p>
-            <a:pPr marL="285750" indent="-285750">
-              <a:buFont typeface="Arial" panose="020B0604020202020204" pitchFamily="34" charset="0"/>
-              <a:buChar char="•"/>
-            </a:pPr>
             <a:r>
               <a:rPr lang="pt-BR" b="1" u="sng" dirty="0">
                 <a:hlinkClick r:id="rId7" action="ppaction://hlinksldjump">
@@ -19095,9 +19089,12 @@
                   </a:extLst>
                 </a:hlinkClick>
               </a:rPr>
-              <a:t>Clientes</a:t>
+              <a:t>produto</a:t>
             </a:r>
-            <a:endParaRPr lang="pt-BR" b="1" u="sng" dirty="0"/>
+            <a:r>
+              <a:rPr lang="pt-BR" b="1" u="sng" dirty="0"/>
+              <a:t> </a:t>
+            </a:r>
           </a:p>
           <a:p>
             <a:pPr marL="285750" indent="-285750">
@@ -19114,7 +19111,7 @@
                   </a:extLst>
                 </a:hlinkClick>
               </a:rPr>
-              <a:t>Backlog</a:t>
+              <a:t>Clientes</a:t>
             </a:r>
             <a:endParaRPr lang="pt-BR" b="1" u="sng" dirty="0"/>
           </a:p>
@@ -19126,6 +19123,25 @@
             <a:r>
               <a:rPr lang="pt-BR" b="1" u="sng" dirty="0">
                 <a:hlinkClick r:id="rId9" action="ppaction://hlinksldjump">
+                  <a:extLst>
+                    <a:ext uri="{A12FA001-AC4F-418D-AE19-62706E023703}">
+                      <ahyp:hlinkClr xmlns:ahyp="http://schemas.microsoft.com/office/drawing/2018/hyperlinkcolor" val="tx"/>
+                    </a:ext>
+                  </a:extLst>
+                </a:hlinkClick>
+              </a:rPr>
+              <a:t>Backlog</a:t>
+            </a:r>
+            <a:endParaRPr lang="pt-BR" b="1" u="sng" dirty="0"/>
+          </a:p>
+          <a:p>
+            <a:pPr marL="285750" indent="-285750">
+              <a:buFont typeface="Arial" panose="020B0604020202020204" pitchFamily="34" charset="0"/>
+              <a:buChar char="•"/>
+            </a:pPr>
+            <a:r>
+              <a:rPr lang="pt-BR" b="1" u="sng" dirty="0">
+                <a:hlinkClick r:id="rId10" action="ppaction://hlinksldjump">
                   <a:extLst>
                     <a:ext uri="{A12FA001-AC4F-418D-AE19-62706E023703}">
                       <ahyp:hlinkClr xmlns:ahyp="http://schemas.microsoft.com/office/drawing/2018/hyperlinkcolor" val="tx"/>
@@ -19141,7 +19157,7 @@
             </a:r>
             <a:r>
               <a:rPr lang="pt-BR" b="1" u="sng" dirty="0">
-                <a:hlinkClick r:id="rId9" action="ppaction://hlinksldjump">
+                <a:hlinkClick r:id="rId10" action="ppaction://hlinksldjump">
                   <a:extLst>
                     <a:ext uri="{A12FA001-AC4F-418D-AE19-62706E023703}">
                       <ahyp:hlinkClr xmlns:ahyp="http://schemas.microsoft.com/office/drawing/2018/hyperlinkcolor" val="tx"/>
@@ -19154,28 +19170,6 @@
             <a:r>
               <a:rPr lang="pt-BR" b="1" u="sng" dirty="0"/>
               <a:t> site </a:t>
-            </a:r>
-          </a:p>
-          <a:p>
-            <a:pPr marL="285750" indent="-285750">
-              <a:buFont typeface="Arial" panose="020B0604020202020204" pitchFamily="34" charset="0"/>
-              <a:buChar char="•"/>
-            </a:pPr>
-            <a:r>
-              <a:rPr lang="pt-BR" b="1" u="sng" dirty="0">
-                <a:hlinkClick r:id="rId10" action="ppaction://hlinksldjump">
-                  <a:extLst>
-                    <a:ext uri="{A12FA001-AC4F-418D-AE19-62706E023703}">
-                      <ahyp:hlinkClr xmlns:ahyp="http://schemas.microsoft.com/office/drawing/2018/hyperlinkcolor" val="tx"/>
-                    </a:ext>
-                  </a:extLst>
-                </a:hlinkClick>
-              </a:rPr>
-              <a:t>Simulador</a:t>
-            </a:r>
-            <a:r>
-              <a:rPr lang="pt-BR" b="1" u="sng" dirty="0"/>
-              <a:t> financeiro </a:t>
             </a:r>
           </a:p>
           <a:p>
@@ -19193,11 +19187,11 @@
                   </a:extLst>
                 </a:hlinkClick>
               </a:rPr>
-              <a:t>Banco</a:t>
+              <a:t>Simulador</a:t>
             </a:r>
             <a:r>
               <a:rPr lang="pt-BR" b="1" u="sng" dirty="0"/>
-              <a:t> de dados </a:t>
+              <a:t> financeiro </a:t>
             </a:r>
           </a:p>
           <a:p>
@@ -19215,11 +19209,11 @@
                   </a:extLst>
                 </a:hlinkClick>
               </a:rPr>
-              <a:t>Arduino</a:t>
+              <a:t>Banco</a:t>
             </a:r>
             <a:r>
               <a:rPr lang="pt-BR" b="1" u="sng" dirty="0"/>
-              <a:t> </a:t>
+              <a:t> de dados </a:t>
             </a:r>
           </a:p>
           <a:p>
@@ -19230,6 +19224,28 @@
             <a:r>
               <a:rPr lang="pt-BR" b="1" u="sng" dirty="0">
                 <a:hlinkClick r:id="rId13" action="ppaction://hlinksldjump">
+                  <a:extLst>
+                    <a:ext uri="{A12FA001-AC4F-418D-AE19-62706E023703}">
+                      <ahyp:hlinkClr xmlns:ahyp="http://schemas.microsoft.com/office/drawing/2018/hyperlinkcolor" val="tx"/>
+                    </a:ext>
+                  </a:extLst>
+                </a:hlinkClick>
+              </a:rPr>
+              <a:t>Arduino</a:t>
+            </a:r>
+            <a:r>
+              <a:rPr lang="pt-BR" b="1" u="sng" dirty="0"/>
+              <a:t> </a:t>
+            </a:r>
+          </a:p>
+          <a:p>
+            <a:pPr marL="285750" indent="-285750">
+              <a:buFont typeface="Arial" panose="020B0604020202020204" pitchFamily="34" charset="0"/>
+              <a:buChar char="•"/>
+            </a:pPr>
+            <a:r>
+              <a:rPr lang="pt-BR" b="1" u="sng" dirty="0">
+                <a:hlinkClick r:id="rId14" action="ppaction://hlinksldjump">
                   <a:extLst>
                     <a:ext uri="{A12FA001-AC4F-418D-AE19-62706E023703}">
                       <ahyp:hlinkClr xmlns:ahyp="http://schemas.microsoft.com/office/drawing/2018/hyperlinkcolor" val="tx"/>

</xml_diff>